<commit_message>
Finished presentation and updated the README
</commit_message>
<xml_diff>
--- a/inst/poster/volleyball_partners.pptx
+++ b/inst/poster/volleyball_partners.pptx
@@ -3573,7 +3573,7 @@
           <a:p>
             <a:r>
               <a:rPr lang="en-US" sz="3600" dirty="0"/>
-              <a:t>What Makes a Doubles Volleyball Partnership Successful?</a:t>
+              <a:t>What Kinds of Doubles Volleyball Partnerships are Successful?</a:t>
             </a:r>
           </a:p>
         </p:txBody>
@@ -4022,7 +4022,7 @@
           <a:p>
             <a:r>
               <a:rPr lang="en-US" sz="3600" dirty="0"/>
-              <a:t>Data, Problem, and Initial Clustering </a:t>
+              <a:t>Problem, Data, and Initial Clustering </a:t>
             </a:r>
           </a:p>
         </p:txBody>
@@ -4077,7 +4077,7 @@
             </a:pPr>
             <a:r>
               <a:rPr lang="en-US" sz="1600" dirty="0"/>
-              <a:t>We want to use clustering in a novel way to examine relationships between player-type partnerships and success</a:t>
+              <a:t>We want to use clustering in a novel way to examine relationships between partner group combination and success</a:t>
             </a:r>
           </a:p>
           <a:p>
@@ -4535,8 +4535,8 @@
         </p:nvSpPr>
         <p:spPr>
           <a:xfrm>
-            <a:off x="355600" y="5175824"/>
-            <a:ext cx="4944016" cy="646331"/>
+            <a:off x="355599" y="5062769"/>
+            <a:ext cx="4944016" cy="830997"/>
           </a:xfrm>
           <a:prstGeom prst="rect">
             <a:avLst/>
@@ -4552,7 +4552,7 @@
             <a:pPr algn="ctr"/>
             <a:r>
               <a:rPr lang="en-US" sz="1200" dirty="0"/>
-              <a:t>Figure 2: Partner Group Combination results, with win percentage on the x axis and the combination on the y axis, darker bar indicates more total games in the dataset</a:t>
+              <a:t>Figure 2: Partner Group Combination results, with win percentage on the x axis and the combination on the y axis, darker bar indicates more total games in the dataset (note that the ”better” combinations generally have a darker bar, which we would expect)</a:t>
             </a:r>
           </a:p>
         </p:txBody>
@@ -5497,7 +5497,7 @@
         </p:nvSpPr>
         <p:spPr>
           <a:xfrm>
-            <a:off x="5118100" y="2568166"/>
+            <a:off x="5118100" y="2545676"/>
             <a:ext cx="2298702" cy="3293209"/>
           </a:xfrm>
           <a:prstGeom prst="rect">
@@ -5832,6 +5832,240 @@
             <a:r>
               <a:rPr lang="en-US" sz="3600" dirty="0"/>
               <a:t>Application and Next Steps</a:t>
+            </a:r>
+          </a:p>
+        </p:txBody>
+      </p:sp>
+      <p:sp>
+        <p:nvSpPr>
+          <p:cNvPr id="10" name="TextBox 9">
+            <a:extLst>
+              <a:ext uri="{FF2B5EF4-FFF2-40B4-BE49-F238E27FC236}">
+                <a16:creationId xmlns:a16="http://schemas.microsoft.com/office/drawing/2014/main" id="{96D1C08A-B99B-0B44-AA2E-1601212232F1}"/>
+              </a:ext>
+            </a:extLst>
+          </p:cNvPr>
+          <p:cNvSpPr txBox="1"/>
+          <p:nvPr/>
+        </p:nvSpPr>
+        <p:spPr>
+          <a:xfrm>
+            <a:off x="406400" y="1001629"/>
+            <a:ext cx="5511800" cy="4770537"/>
+          </a:xfrm>
+          <a:prstGeom prst="rect">
+            <a:avLst/>
+          </a:prstGeom>
+          <a:noFill/>
+        </p:spPr>
+        <p:txBody>
+          <a:bodyPr wrap="square" rtlCol="0">
+            <a:spAutoFit/>
+          </a:bodyPr>
+          <a:lstStyle/>
+          <a:p>
+            <a:r>
+              <a:rPr lang="en-US" sz="1600" b="1" dirty="0"/>
+              <a:t>Potential Applications:</a:t>
+            </a:r>
+          </a:p>
+          <a:p>
+            <a:pPr marL="285750" indent="-285750">
+              <a:buFont typeface="Arial" panose="020B0604020202020204" pitchFamily="34" charset="0"/>
+              <a:buChar char="•"/>
+            </a:pPr>
+            <a:r>
+              <a:rPr lang="en-US" sz="1600" dirty="0"/>
+              <a:t>Given a beach volleyball player, determine the optimal partner group</a:t>
+            </a:r>
+          </a:p>
+          <a:p>
+            <a:pPr marL="285750" indent="-285750">
+              <a:buFont typeface="Arial" panose="020B0604020202020204" pitchFamily="34" charset="0"/>
+              <a:buChar char="•"/>
+            </a:pPr>
+            <a:r>
+              <a:rPr lang="en-US" sz="1600" dirty="0"/>
+              <a:t>Given an opponent, determine the partner group combination with the best possible chance of winning against the opponent</a:t>
+            </a:r>
+          </a:p>
+          <a:p>
+            <a:pPr marL="285750" indent="-285750">
+              <a:buFont typeface="Arial" panose="020B0604020202020204" pitchFamily="34" charset="0"/>
+              <a:buChar char="•"/>
+            </a:pPr>
+            <a:r>
+              <a:rPr lang="en-US" sz="1600" dirty="0"/>
+              <a:t>As an organizer of a tournament, decide which match-ups are most likely to be close so that those can be televised or scheduled for “prime time” </a:t>
+            </a:r>
+          </a:p>
+          <a:p>
+            <a:r>
+              <a:rPr lang="en-US" sz="1600" b="1" dirty="0"/>
+              <a:t>Potential Problems/Limitations:</a:t>
+            </a:r>
+          </a:p>
+          <a:p>
+            <a:pPr marL="285750" indent="-285750">
+              <a:buFont typeface="Arial" panose="020B0604020202020204" pitchFamily="34" charset="0"/>
+              <a:buChar char="•"/>
+            </a:pPr>
+            <a:r>
+              <a:rPr lang="en-US" sz="1600" dirty="0"/>
+              <a:t>Although the number of players in each cluster was about the same, the number of games played by the players in each cluster was very skewed (with 3s and 1s playing many more games than 2s and 4s) which could lead to bias in the results</a:t>
+            </a:r>
+          </a:p>
+          <a:p>
+            <a:pPr marL="285750" indent="-285750">
+              <a:buFont typeface="Arial" panose="020B0604020202020204" pitchFamily="34" charset="0"/>
+              <a:buChar char="•"/>
+            </a:pPr>
+            <a:r>
+              <a:rPr lang="en-US" sz="1600" dirty="0"/>
+              <a:t>Although the initial problem talked about “big” players vs. all-around players, variables other than height were included in the analysis so the resulting groups are not clearly defined in terms of volleyball jargon</a:t>
+            </a:r>
+          </a:p>
+        </p:txBody>
+      </p:sp>
+      <p:sp>
+        <p:nvSpPr>
+          <p:cNvPr id="11" name="TextBox 10">
+            <a:extLst>
+              <a:ext uri="{FF2B5EF4-FFF2-40B4-BE49-F238E27FC236}">
+                <a16:creationId xmlns:a16="http://schemas.microsoft.com/office/drawing/2014/main" id="{C4D32B7C-8842-B44E-9A8A-E1C17B871012}"/>
+              </a:ext>
+            </a:extLst>
+          </p:cNvPr>
+          <p:cNvSpPr txBox="1"/>
+          <p:nvPr/>
+        </p:nvSpPr>
+        <p:spPr>
+          <a:xfrm>
+            <a:off x="6096000" y="1012744"/>
+            <a:ext cx="5511800" cy="4770537"/>
+          </a:xfrm>
+          <a:prstGeom prst="rect">
+            <a:avLst/>
+          </a:prstGeom>
+          <a:noFill/>
+        </p:spPr>
+        <p:txBody>
+          <a:bodyPr wrap="square" rtlCol="0">
+            <a:spAutoFit/>
+          </a:bodyPr>
+          <a:lstStyle/>
+          <a:p>
+            <a:r>
+              <a:rPr lang="en-US" sz="1600" b="1" dirty="0"/>
+              <a:t>Next Steps:</a:t>
+            </a:r>
+          </a:p>
+          <a:p>
+            <a:pPr marL="285750" indent="-285750">
+              <a:buFont typeface="Arial" panose="020B0604020202020204" pitchFamily="34" charset="0"/>
+              <a:buChar char="•"/>
+            </a:pPr>
+            <a:r>
+              <a:rPr lang="en-US" sz="1600" dirty="0"/>
+              <a:t>Perform a similar analysis for women’s volleyball and compare the results – Are successful groupings in men’s volleyball similar to successful groupings in women’s volleyball?</a:t>
+            </a:r>
+          </a:p>
+          <a:p>
+            <a:pPr marL="285750" indent="-285750">
+              <a:buFont typeface="Arial" panose="020B0604020202020204" pitchFamily="34" charset="0"/>
+              <a:buChar char="•"/>
+            </a:pPr>
+            <a:r>
+              <a:rPr lang="en-US" sz="1600" dirty="0"/>
+              <a:t>Analyze the cluster results by country/nationality – Are players from one country more likely to be in one cluster than another? Does a combination from one country significantly outperform the same combination from another country on average? </a:t>
+            </a:r>
+          </a:p>
+          <a:p>
+            <a:pPr marL="285750" indent="-285750">
+              <a:buFont typeface="Arial" panose="020B0604020202020204" pitchFamily="34" charset="0"/>
+              <a:buChar char="•"/>
+            </a:pPr>
+            <a:r>
+              <a:rPr lang="en-US" sz="1600" dirty="0"/>
+              <a:t>Create an R shiny app so interested parties can explore the results</a:t>
+            </a:r>
+          </a:p>
+          <a:p>
+            <a:r>
+              <a:rPr lang="en-US" sz="1600" b="1" dirty="0"/>
+              <a:t>Additional Resources:</a:t>
+            </a:r>
+          </a:p>
+          <a:p>
+            <a:pPr marL="285750" indent="-285750">
+              <a:buFont typeface="Arial" panose="020B0604020202020204" pitchFamily="34" charset="0"/>
+              <a:buChar char="•"/>
+            </a:pPr>
+            <a:r>
+              <a:rPr lang="en-US" sz="1600" dirty="0"/>
+              <a:t>View the </a:t>
+            </a:r>
+            <a:r>
+              <a:rPr lang="en-US" sz="1600" dirty="0" err="1"/>
+              <a:t>github</a:t>
+            </a:r>
+            <a:r>
+              <a:rPr lang="en-US" sz="1600" dirty="0"/>
+              <a:t> repo for a step-by-step walk-through of the analysis, including plot creation (</a:t>
+            </a:r>
+            <a:r>
+              <a:rPr lang="en-US" sz="1600" dirty="0">
+                <a:hlinkClick r:id="rId3"/>
+              </a:rPr>
+              <a:t>https://github.com/srmatth/volleyball</a:t>
+            </a:r>
+            <a:r>
+              <a:rPr lang="en-US" sz="1600" dirty="0"/>
+              <a:t>)</a:t>
+            </a:r>
+          </a:p>
+          <a:p>
+            <a:pPr marL="285750" indent="-285750">
+              <a:buFont typeface="Arial" panose="020B0604020202020204" pitchFamily="34" charset="0"/>
+              <a:buChar char="•"/>
+            </a:pPr>
+            <a:r>
+              <a:rPr lang="en-US" sz="1600" dirty="0"/>
+              <a:t>For more information about the data, visit the Kaggle posting (</a:t>
+            </a:r>
+            <a:r>
+              <a:rPr lang="en-US" sz="1600" dirty="0">
+                <a:hlinkClick r:id="rId4"/>
+              </a:rPr>
+              <a:t>https://</a:t>
+            </a:r>
+            <a:r>
+              <a:rPr lang="en-US" sz="1600" dirty="0" err="1">
+                <a:hlinkClick r:id="rId4"/>
+              </a:rPr>
+              <a:t>www.kaggle.com</a:t>
+            </a:r>
+            <a:r>
+              <a:rPr lang="en-US" sz="1600" dirty="0">
+                <a:hlinkClick r:id="rId4"/>
+              </a:rPr>
+              <a:t>/</a:t>
+            </a:r>
+            <a:r>
+              <a:rPr lang="en-US" sz="1600" dirty="0" err="1">
+                <a:hlinkClick r:id="rId4"/>
+              </a:rPr>
+              <a:t>jessemostipak</a:t>
+            </a:r>
+            <a:r>
+              <a:rPr lang="en-US" sz="1600" dirty="0">
+                <a:hlinkClick r:id="rId4"/>
+              </a:rPr>
+              <a:t>/beach-volleyball</a:t>
+            </a:r>
+            <a:r>
+              <a:rPr lang="en-US" sz="1600" dirty="0"/>
+              <a:t>)</a:t>
             </a:r>
           </a:p>
         </p:txBody>

</xml_diff>